<commit_message>
updated architecture png file
</commit_message>
<xml_diff>
--- a/images/schematic-aws.pptx
+++ b/images/schematic-aws.pptx
@@ -6,7 +6,6 @@
   </p:sldMasterIdLst>
   <p:sldIdLst>
     <p:sldId id="257" r:id="rId2"/>
-    <p:sldId id="256" r:id="rId3"/>
   </p:sldIdLst>
   <p:sldSz cx="12192000" cy="6858000"/>
   <p:notesSz cx="6858000" cy="9144000"/>
@@ -3350,276 +3349,29 @@
       </p:grpSpPr>
       <p:sp>
         <p:nvSpPr>
-          <p:cNvPr id="5" name="TextBox 4">
-            <a:extLst>
-              <a:ext uri="{FF2B5EF4-FFF2-40B4-BE49-F238E27FC236}">
-                <a16:creationId xmlns:a16="http://schemas.microsoft.com/office/drawing/2014/main" id="{1847FBBD-326E-010D-B189-5B2D66B354B9}"/>
-              </a:ext>
-            </a:extLst>
-          </p:cNvPr>
-          <p:cNvSpPr txBox="1"/>
+          <p:cNvPr id="3" name="Rectangle: Rounded Corners 2">
+            <a:extLst>
+              <a:ext uri="{FF2B5EF4-FFF2-40B4-BE49-F238E27FC236}">
+                <a16:creationId xmlns:a16="http://schemas.microsoft.com/office/drawing/2014/main" id="{15FA055B-76EC-1274-6F77-C1993FA1A60B}"/>
+              </a:ext>
+            </a:extLst>
+          </p:cNvPr>
+          <p:cNvSpPr/>
           <p:nvPr/>
         </p:nvSpPr>
         <p:spPr>
           <a:xfrm>
-            <a:off x="3657051" y="2029767"/>
-            <a:ext cx="5037341" cy="830997"/>
-          </a:xfrm>
-          <a:prstGeom prst="rect">
-            <a:avLst/>
-          </a:prstGeom>
-          <a:noFill/>
-        </p:spPr>
-        <p:txBody>
-          <a:bodyPr wrap="none" rtlCol="0">
-            <a:spAutoFit/>
-          </a:bodyPr>
-          <a:lstStyle/>
-          <a:p>
-            <a:r>
-              <a:rPr lang="en-US" sz="2400" b="1" dirty="0"/>
-              <a:t>S3 bucket</a:t>
-            </a:r>
-          </a:p>
-          <a:p>
-            <a:pPr marL="342900" indent="-342900">
-              <a:buFontTx/>
-              <a:buChar char="-"/>
-            </a:pPr>
-            <a:r>
-              <a:rPr lang="en-US" sz="2400" b="1" dirty="0"/>
-              <a:t>Model (tokenizer + </a:t>
-            </a:r>
-            <a:r>
-              <a:rPr lang="en-US" sz="2400" b="1" dirty="0" err="1"/>
-              <a:t>safetensor</a:t>
-            </a:r>
-            <a:r>
-              <a:rPr lang="en-US" sz="2400" b="1" dirty="0"/>
-              <a:t> files)</a:t>
-            </a:r>
-          </a:p>
-        </p:txBody>
-      </p:sp>
-      <p:sp>
-        <p:nvSpPr>
-          <p:cNvPr id="6" name="TextBox 5">
-            <a:extLst>
-              <a:ext uri="{FF2B5EF4-FFF2-40B4-BE49-F238E27FC236}">
-                <a16:creationId xmlns:a16="http://schemas.microsoft.com/office/drawing/2014/main" id="{6C7E9416-F1FF-9C09-F08F-2E566C5F771D}"/>
-              </a:ext>
-            </a:extLst>
-          </p:cNvPr>
-          <p:cNvSpPr txBox="1"/>
-          <p:nvPr/>
-        </p:nvSpPr>
-        <p:spPr>
-          <a:xfrm>
-            <a:off x="3497610" y="140346"/>
-            <a:ext cx="4450706" cy="1200329"/>
-          </a:xfrm>
-          <a:prstGeom prst="rect">
-            <a:avLst/>
-          </a:prstGeom>
-          <a:noFill/>
-        </p:spPr>
-        <p:txBody>
-          <a:bodyPr wrap="none" rtlCol="0">
-            <a:spAutoFit/>
-          </a:bodyPr>
-          <a:lstStyle/>
-          <a:p>
-            <a:r>
-              <a:rPr lang="en-US" sz="2400" b="1" dirty="0" err="1"/>
-              <a:t>RunPod</a:t>
-            </a:r>
-            <a:r>
-              <a:rPr lang="en-US" sz="2400" b="1" dirty="0"/>
-              <a:t> container/</a:t>
-            </a:r>
-            <a:r>
-              <a:rPr lang="en-US" sz="2400" b="1" dirty="0" err="1"/>
-              <a:t>Colab</a:t>
-            </a:r>
-            <a:r>
-              <a:rPr lang="en-US" sz="2400" b="1" dirty="0"/>
-              <a:t> instance</a:t>
-            </a:r>
-          </a:p>
-          <a:p>
-            <a:pPr marL="342900" indent="-342900">
-              <a:buFontTx/>
-              <a:buChar char="-"/>
-            </a:pPr>
-            <a:r>
-              <a:rPr lang="en-US" sz="2400" b="1" dirty="0"/>
-              <a:t>CSV file with training data </a:t>
-            </a:r>
-          </a:p>
-          <a:p>
-            <a:pPr marL="342900" indent="-342900">
-              <a:buFontTx/>
-              <a:buChar char="-"/>
-            </a:pPr>
-            <a:r>
-              <a:rPr lang="en-US" sz="2400" b="1" dirty="0"/>
-              <a:t>Training .</a:t>
-            </a:r>
-            <a:r>
-              <a:rPr lang="en-US" sz="2400" b="1" dirty="0" err="1"/>
-              <a:t>ipynb</a:t>
-            </a:r>
-            <a:r>
-              <a:rPr lang="en-US" sz="2400" b="1" dirty="0"/>
-              <a:t> notebook</a:t>
-            </a:r>
-          </a:p>
-        </p:txBody>
-      </p:sp>
-      <p:sp>
-        <p:nvSpPr>
-          <p:cNvPr id="7" name="TextBox 6">
-            <a:extLst>
-              <a:ext uri="{FF2B5EF4-FFF2-40B4-BE49-F238E27FC236}">
-                <a16:creationId xmlns:a16="http://schemas.microsoft.com/office/drawing/2014/main" id="{B7301DE1-9264-9811-4DEF-43CCE55E4EAE}"/>
-              </a:ext>
-            </a:extLst>
-          </p:cNvPr>
-          <p:cNvSpPr txBox="1"/>
-          <p:nvPr/>
-        </p:nvSpPr>
-        <p:spPr>
-          <a:xfrm>
-            <a:off x="3929039" y="3397072"/>
-            <a:ext cx="4151357" cy="1200329"/>
-          </a:xfrm>
-          <a:prstGeom prst="rect">
-            <a:avLst/>
-          </a:prstGeom>
-          <a:noFill/>
-        </p:spPr>
-        <p:txBody>
-          <a:bodyPr wrap="square" rtlCol="0">
-            <a:spAutoFit/>
-          </a:bodyPr>
-          <a:lstStyle/>
-          <a:p>
-            <a:pPr algn="l"/>
-            <a:r>
-              <a:rPr lang="en-US" sz="2400" b="1" i="0" dirty="0">
-                <a:effectLst/>
-                <a:latin typeface="+mj-lt"/>
-              </a:rPr>
-              <a:t>Deploy a Hugging Face Transformer model from S3 to </a:t>
-            </a:r>
-            <a:r>
-              <a:rPr lang="en-US" sz="2400" b="1" i="0" dirty="0" err="1">
-                <a:effectLst/>
-                <a:latin typeface="+mj-lt"/>
-              </a:rPr>
-              <a:t>SageMaker</a:t>
-            </a:r>
-            <a:r>
-              <a:rPr lang="en-US" sz="2400" b="1" i="0" dirty="0">
-                <a:effectLst/>
-                <a:latin typeface="+mj-lt"/>
-              </a:rPr>
-              <a:t> for inference</a:t>
-            </a:r>
-          </a:p>
-        </p:txBody>
-      </p:sp>
-      <p:sp>
-        <p:nvSpPr>
-          <p:cNvPr id="8" name="TextBox 7">
-            <a:extLst>
-              <a:ext uri="{FF2B5EF4-FFF2-40B4-BE49-F238E27FC236}">
-                <a16:creationId xmlns:a16="http://schemas.microsoft.com/office/drawing/2014/main" id="{67FA5750-2D4C-A570-659C-1DE866025505}"/>
-              </a:ext>
-            </a:extLst>
-          </p:cNvPr>
-          <p:cNvSpPr txBox="1"/>
-          <p:nvPr/>
-        </p:nvSpPr>
-        <p:spPr>
-          <a:xfrm>
-            <a:off x="4278849" y="5103674"/>
-            <a:ext cx="2888227" cy="461665"/>
-          </a:xfrm>
-          <a:prstGeom prst="rect">
-            <a:avLst/>
-          </a:prstGeom>
-          <a:noFill/>
-        </p:spPr>
-        <p:txBody>
-          <a:bodyPr wrap="none" rtlCol="0">
-            <a:spAutoFit/>
-          </a:bodyPr>
-          <a:lstStyle/>
-          <a:p>
-            <a:r>
-              <a:rPr lang="en-US" sz="2400" b="1" dirty="0" err="1"/>
-              <a:t>Streamlit</a:t>
-            </a:r>
-            <a:r>
-              <a:rPr lang="en-US" sz="2400" b="1" dirty="0"/>
-              <a:t> UI for users</a:t>
-            </a:r>
-          </a:p>
-        </p:txBody>
-      </p:sp>
-    </p:spTree>
-    <p:extLst>
-      <p:ext uri="{BB962C8B-B14F-4D97-AF65-F5344CB8AC3E}">
-        <p14:creationId xmlns:p14="http://schemas.microsoft.com/office/powerpoint/2010/main" val="2496691747"/>
-      </p:ext>
-    </p:extLst>
-  </p:cSld>
-  <p:clrMapOvr>
-    <a:masterClrMapping/>
-  </p:clrMapOvr>
-</p:sld>
-</file>
-
-<file path=ppt/slides/slide2.xml><?xml version="1.0" encoding="utf-8"?>
-<p:sld xmlns:a="http://schemas.openxmlformats.org/drawingml/2006/main" xmlns:r="http://schemas.openxmlformats.org/officeDocument/2006/relationships" xmlns:p="http://schemas.openxmlformats.org/presentationml/2006/main">
-  <p:cSld>
-    <p:spTree>
-      <p:nvGrpSpPr>
-        <p:cNvPr id="1" name=""/>
-        <p:cNvGrpSpPr/>
-        <p:nvPr/>
-      </p:nvGrpSpPr>
-      <p:grpSpPr>
-        <a:xfrm>
-          <a:off x="0" y="0"/>
-          <a:ext cx="0" cy="0"/>
-          <a:chOff x="0" y="0"/>
-          <a:chExt cx="0" cy="0"/>
-        </a:xfrm>
-      </p:grpSpPr>
-      <p:sp>
-        <p:nvSpPr>
-          <p:cNvPr id="4" name="Rectangle: Rounded Corners 3">
-            <a:extLst>
-              <a:ext uri="{FF2B5EF4-FFF2-40B4-BE49-F238E27FC236}">
-                <a16:creationId xmlns:a16="http://schemas.microsoft.com/office/drawing/2014/main" id="{9C2492A7-CF93-B267-D552-502BFE548E0C}"/>
-              </a:ext>
-            </a:extLst>
-          </p:cNvPr>
-          <p:cNvSpPr/>
-          <p:nvPr/>
-        </p:nvSpPr>
-        <p:spPr>
-          <a:xfrm>
-            <a:off x="976989" y="2763120"/>
-            <a:ext cx="1554480" cy="726440"/>
+            <a:off x="4574228" y="3428686"/>
+            <a:ext cx="3515361" cy="1577603"/>
           </a:xfrm>
           <a:prstGeom prst="roundRect">
             <a:avLst/>
           </a:prstGeom>
           <a:solidFill>
-            <a:srgbClr val="00B050"/>
+            <a:schemeClr val="accent2">
+              <a:lumMod val="40000"/>
+              <a:lumOff val="60000"/>
+            </a:schemeClr>
           </a:solidFill>
         </p:spPr>
         <p:style>
@@ -3643,37 +3395,675 @@
           <a:lstStyle/>
           <a:p>
             <a:pPr algn="ctr"/>
+            <a:endParaRPr lang="en-SG" dirty="0"/>
+          </a:p>
+        </p:txBody>
+      </p:sp>
+      <p:sp>
+        <p:nvSpPr>
+          <p:cNvPr id="2" name="Rectangle: Rounded Corners 1">
+            <a:extLst>
+              <a:ext uri="{FF2B5EF4-FFF2-40B4-BE49-F238E27FC236}">
+                <a16:creationId xmlns:a16="http://schemas.microsoft.com/office/drawing/2014/main" id="{24863A1E-E519-B616-AB6A-8D8FED7F8AE6}"/>
+              </a:ext>
+            </a:extLst>
+          </p:cNvPr>
+          <p:cNvSpPr/>
+          <p:nvPr/>
+        </p:nvSpPr>
+        <p:spPr>
+          <a:xfrm>
+            <a:off x="4574228" y="5425080"/>
+            <a:ext cx="3515359" cy="1080748"/>
+          </a:xfrm>
+          <a:prstGeom prst="roundRect">
+            <a:avLst/>
+          </a:prstGeom>
+          <a:solidFill>
+            <a:schemeClr val="accent1">
+              <a:lumMod val="40000"/>
+              <a:lumOff val="60000"/>
+            </a:schemeClr>
+          </a:solidFill>
+        </p:spPr>
+        <p:style>
+          <a:lnRef idx="2">
+            <a:schemeClr val="accent1">
+              <a:shade val="15000"/>
+            </a:schemeClr>
+          </a:lnRef>
+          <a:fillRef idx="1">
+            <a:schemeClr val="accent1"/>
+          </a:fillRef>
+          <a:effectRef idx="0">
+            <a:schemeClr val="accent1"/>
+          </a:effectRef>
+          <a:fontRef idx="minor">
+            <a:schemeClr val="lt1"/>
+          </a:fontRef>
+        </p:style>
+        <p:txBody>
+          <a:bodyPr rtlCol="0" anchor="ctr"/>
+          <a:lstStyle/>
+          <a:p>
+            <a:pPr algn="ctr"/>
+            <a:endParaRPr lang="en-SG" dirty="0"/>
+          </a:p>
+        </p:txBody>
+      </p:sp>
+      <p:sp>
+        <p:nvSpPr>
+          <p:cNvPr id="7" name="TextBox 6">
+            <a:extLst>
+              <a:ext uri="{FF2B5EF4-FFF2-40B4-BE49-F238E27FC236}">
+                <a16:creationId xmlns:a16="http://schemas.microsoft.com/office/drawing/2014/main" id="{B7301DE1-9264-9811-4DEF-43CCE55E4EAE}"/>
+              </a:ext>
+            </a:extLst>
+          </p:cNvPr>
+          <p:cNvSpPr txBox="1"/>
+          <p:nvPr/>
+        </p:nvSpPr>
+        <p:spPr>
+          <a:xfrm>
+            <a:off x="4631980" y="3517052"/>
+            <a:ext cx="3383711" cy="738664"/>
+          </a:xfrm>
+          <a:prstGeom prst="rect">
+            <a:avLst/>
+          </a:prstGeom>
+          <a:noFill/>
+        </p:spPr>
+        <p:txBody>
+          <a:bodyPr wrap="square" rtlCol="0">
+            <a:spAutoFit/>
+          </a:bodyPr>
+          <a:lstStyle/>
+          <a:p>
+            <a:pPr algn="l"/>
+            <a:r>
+              <a:rPr lang="en-US" sz="2100" b="1" i="0" dirty="0">
+                <a:effectLst/>
+              </a:rPr>
+              <a:t>Model endpoint deployment (Amazon </a:t>
+            </a:r>
+            <a:r>
+              <a:rPr lang="en-US" sz="2100" b="1" i="0" dirty="0" err="1">
+                <a:effectLst/>
+              </a:rPr>
+              <a:t>SageMaker</a:t>
+            </a:r>
+            <a:r>
+              <a:rPr lang="en-US" sz="2100" b="1" i="0" dirty="0">
+                <a:effectLst/>
+              </a:rPr>
+              <a:t>)</a:t>
+            </a:r>
+          </a:p>
+        </p:txBody>
+      </p:sp>
+      <p:sp>
+        <p:nvSpPr>
+          <p:cNvPr id="8" name="TextBox 7">
+            <a:extLst>
+              <a:ext uri="{FF2B5EF4-FFF2-40B4-BE49-F238E27FC236}">
+                <a16:creationId xmlns:a16="http://schemas.microsoft.com/office/drawing/2014/main" id="{67FA5750-2D4C-A570-659C-1DE866025505}"/>
+              </a:ext>
+            </a:extLst>
+          </p:cNvPr>
+          <p:cNvSpPr txBox="1"/>
+          <p:nvPr/>
+        </p:nvSpPr>
+        <p:spPr>
+          <a:xfrm>
+            <a:off x="5455159" y="5535524"/>
+            <a:ext cx="1753493" cy="415498"/>
+          </a:xfrm>
+          <a:prstGeom prst="rect">
+            <a:avLst/>
+          </a:prstGeom>
+          <a:noFill/>
+        </p:spPr>
+        <p:txBody>
+          <a:bodyPr wrap="none" rtlCol="0">
+            <a:spAutoFit/>
+          </a:bodyPr>
+          <a:lstStyle/>
+          <a:p>
+            <a:r>
+              <a:rPr lang="en-US" sz="2100" b="1" dirty="0"/>
+              <a:t>User interface</a:t>
+            </a:r>
+          </a:p>
+        </p:txBody>
+      </p:sp>
+      <p:pic>
+        <p:nvPicPr>
+          <p:cNvPr id="1026" name="Picture 2" descr="Streamlit logo on light background">
+            <a:extLst>
+              <a:ext uri="{FF2B5EF4-FFF2-40B4-BE49-F238E27FC236}">
+                <a16:creationId xmlns:a16="http://schemas.microsoft.com/office/drawing/2014/main" id="{2D34BF11-6BFD-E79E-E4C6-F91AC58E8049}"/>
+              </a:ext>
+            </a:extLst>
+          </p:cNvPr>
+          <p:cNvPicPr>
+            <a:picLocks noChangeAspect="1" noChangeArrowheads="1"/>
+          </p:cNvPicPr>
+          <p:nvPr/>
+        </p:nvPicPr>
+        <p:blipFill>
+          <a:blip r:embed="rId2">
+            <a:extLst>
+              <a:ext uri="{28A0092B-C50C-407E-A947-70E740481C1C}">
+                <a14:useLocalDpi xmlns:a14="http://schemas.microsoft.com/office/drawing/2010/main" val="0"/>
+              </a:ext>
+            </a:extLst>
+          </a:blip>
+          <a:srcRect/>
+          <a:stretch>
+            <a:fillRect/>
+          </a:stretch>
+        </p:blipFill>
+        <p:spPr bwMode="auto">
+          <a:xfrm>
+            <a:off x="5403630" y="5951022"/>
+            <a:ext cx="1753493" cy="486777"/>
+          </a:xfrm>
+          <a:prstGeom prst="rect">
+            <a:avLst/>
+          </a:prstGeom>
+          <a:noFill/>
+          <a:extLst>
+            <a:ext uri="{909E8E84-426E-40DD-AFC4-6F175D3DCCD1}">
+              <a14:hiddenFill xmlns:a14="http://schemas.microsoft.com/office/drawing/2010/main">
+                <a:solidFill>
+                  <a:srgbClr val="FFFFFF"/>
+                </a:solidFill>
+              </a14:hiddenFill>
+            </a:ext>
+          </a:extLst>
+        </p:spPr>
+      </p:pic>
+      <p:pic>
+        <p:nvPicPr>
+          <p:cNvPr id="1028" name="Picture 4" descr="Amazon SageMaker SVG Logo | Free SVG logos &amp; icons download | SVGmix">
+            <a:extLst>
+              <a:ext uri="{FF2B5EF4-FFF2-40B4-BE49-F238E27FC236}">
+                <a16:creationId xmlns:a16="http://schemas.microsoft.com/office/drawing/2014/main" id="{994BE314-182D-CE92-BC4C-27E21785F1F9}"/>
+              </a:ext>
+            </a:extLst>
+          </p:cNvPr>
+          <p:cNvPicPr>
+            <a:picLocks noChangeAspect="1" noChangeArrowheads="1"/>
+          </p:cNvPicPr>
+          <p:nvPr/>
+        </p:nvPicPr>
+        <p:blipFill>
+          <a:blip r:embed="rId3">
+            <a:extLst>
+              <a:ext uri="{28A0092B-C50C-407E-A947-70E740481C1C}">
+                <a14:useLocalDpi xmlns:a14="http://schemas.microsoft.com/office/drawing/2010/main" val="0"/>
+              </a:ext>
+            </a:extLst>
+          </a:blip>
+          <a:srcRect/>
+          <a:stretch>
+            <a:fillRect/>
+          </a:stretch>
+        </p:blipFill>
+        <p:spPr bwMode="auto">
+          <a:xfrm>
+            <a:off x="6022756" y="4265401"/>
+            <a:ext cx="618295" cy="618295"/>
+          </a:xfrm>
+          <a:prstGeom prst="rect">
+            <a:avLst/>
+          </a:prstGeom>
+          <a:noFill/>
+          <a:extLst>
+            <a:ext uri="{909E8E84-426E-40DD-AFC4-6F175D3DCCD1}">
+              <a14:hiddenFill xmlns:a14="http://schemas.microsoft.com/office/drawing/2010/main">
+                <a:solidFill>
+                  <a:srgbClr val="FFFFFF"/>
+                </a:solidFill>
+              </a14:hiddenFill>
+            </a:ext>
+          </a:extLst>
+        </p:spPr>
+      </p:pic>
+      <p:sp>
+        <p:nvSpPr>
+          <p:cNvPr id="4" name="Rectangle: Rounded Corners 3">
+            <a:extLst>
+              <a:ext uri="{FF2B5EF4-FFF2-40B4-BE49-F238E27FC236}">
+                <a16:creationId xmlns:a16="http://schemas.microsoft.com/office/drawing/2014/main" id="{A86A40B2-D1AC-2FC6-2766-1DB8D44370DD}"/>
+              </a:ext>
+            </a:extLst>
+          </p:cNvPr>
+          <p:cNvSpPr/>
+          <p:nvPr/>
+        </p:nvSpPr>
+        <p:spPr>
+          <a:xfrm>
+            <a:off x="4564605" y="1846366"/>
+            <a:ext cx="3515360" cy="1163498"/>
+          </a:xfrm>
+          <a:prstGeom prst="roundRect">
+            <a:avLst/>
+          </a:prstGeom>
+          <a:solidFill>
+            <a:schemeClr val="accent3">
+              <a:lumMod val="40000"/>
+              <a:lumOff val="60000"/>
+            </a:schemeClr>
+          </a:solidFill>
+        </p:spPr>
+        <p:style>
+          <a:lnRef idx="2">
+            <a:schemeClr val="accent1">
+              <a:shade val="15000"/>
+            </a:schemeClr>
+          </a:lnRef>
+          <a:fillRef idx="1">
+            <a:schemeClr val="accent1"/>
+          </a:fillRef>
+          <a:effectRef idx="0">
+            <a:schemeClr val="accent1"/>
+          </a:effectRef>
+          <a:fontRef idx="minor">
+            <a:schemeClr val="lt1"/>
+          </a:fontRef>
+        </p:style>
+        <p:txBody>
+          <a:bodyPr rtlCol="0" anchor="ctr"/>
+          <a:lstStyle/>
+          <a:p>
+            <a:pPr algn="ctr"/>
+            <a:endParaRPr lang="en-SG" dirty="0"/>
+          </a:p>
+        </p:txBody>
+      </p:sp>
+      <p:sp>
+        <p:nvSpPr>
+          <p:cNvPr id="9" name="TextBox 8">
+            <a:extLst>
+              <a:ext uri="{FF2B5EF4-FFF2-40B4-BE49-F238E27FC236}">
+                <a16:creationId xmlns:a16="http://schemas.microsoft.com/office/drawing/2014/main" id="{35E3898F-DD2A-231D-3051-B7A06FEE6841}"/>
+              </a:ext>
+            </a:extLst>
+          </p:cNvPr>
+          <p:cNvSpPr txBox="1"/>
+          <p:nvPr/>
+        </p:nvSpPr>
+        <p:spPr>
+          <a:xfrm>
+            <a:off x="4896643" y="1845033"/>
+            <a:ext cx="3383711" cy="415498"/>
+          </a:xfrm>
+          <a:prstGeom prst="rect">
+            <a:avLst/>
+          </a:prstGeom>
+          <a:noFill/>
+        </p:spPr>
+        <p:txBody>
+          <a:bodyPr wrap="square" rtlCol="0">
+            <a:spAutoFit/>
+          </a:bodyPr>
+          <a:lstStyle/>
+          <a:p>
+            <a:pPr algn="l"/>
+            <a:r>
+              <a:rPr lang="en-US" sz="2100" b="1" i="0" dirty="0">
+                <a:effectLst/>
+              </a:rPr>
+              <a:t>Save model in S3 bucket</a:t>
+            </a:r>
+          </a:p>
+        </p:txBody>
+      </p:sp>
+      <p:pic>
+        <p:nvPicPr>
+          <p:cNvPr id="1030" name="Picture 6">
+            <a:extLst>
+              <a:ext uri="{FF2B5EF4-FFF2-40B4-BE49-F238E27FC236}">
+                <a16:creationId xmlns:a16="http://schemas.microsoft.com/office/drawing/2014/main" id="{D46440B8-29BD-3E13-6EF9-107680DAACA9}"/>
+              </a:ext>
+            </a:extLst>
+          </p:cNvPr>
+          <p:cNvPicPr>
+            <a:picLocks noChangeAspect="1" noChangeArrowheads="1"/>
+          </p:cNvPicPr>
+          <p:nvPr/>
+        </p:nvPicPr>
+        <p:blipFill>
+          <a:blip r:embed="rId4">
+            <a:extLst>
+              <a:ext uri="{28A0092B-C50C-407E-A947-70E740481C1C}">
+                <a14:useLocalDpi xmlns:a14="http://schemas.microsoft.com/office/drawing/2010/main" val="0"/>
+              </a:ext>
+            </a:extLst>
+          </a:blip>
+          <a:srcRect/>
+          <a:stretch>
+            <a:fillRect/>
+          </a:stretch>
+        </p:blipFill>
+        <p:spPr bwMode="auto">
+          <a:xfrm>
+            <a:off x="6047849" y="2256996"/>
+            <a:ext cx="555166" cy="664171"/>
+          </a:xfrm>
+          <a:prstGeom prst="rect">
+            <a:avLst/>
+          </a:prstGeom>
+          <a:noFill/>
+          <a:extLst>
+            <a:ext uri="{909E8E84-426E-40DD-AFC4-6F175D3DCCD1}">
+              <a14:hiddenFill xmlns:a14="http://schemas.microsoft.com/office/drawing/2010/main">
+                <a:solidFill>
+                  <a:srgbClr val="FFFFFF"/>
+                </a:solidFill>
+              </a14:hiddenFill>
+            </a:ext>
+          </a:extLst>
+        </p:spPr>
+      </p:pic>
+      <p:sp>
+        <p:nvSpPr>
+          <p:cNvPr id="10" name="Rectangle: Rounded Corners 9">
+            <a:extLst>
+              <a:ext uri="{FF2B5EF4-FFF2-40B4-BE49-F238E27FC236}">
+                <a16:creationId xmlns:a16="http://schemas.microsoft.com/office/drawing/2014/main" id="{9F291BA8-26D5-2B0A-2350-CCBC7A9B0E29}"/>
+              </a:ext>
+            </a:extLst>
+          </p:cNvPr>
+          <p:cNvSpPr/>
+          <p:nvPr/>
+        </p:nvSpPr>
+        <p:spPr>
+          <a:xfrm>
+            <a:off x="4564605" y="141829"/>
+            <a:ext cx="3515360" cy="1252277"/>
+          </a:xfrm>
+          <a:prstGeom prst="roundRect">
+            <a:avLst/>
+          </a:prstGeom>
+          <a:solidFill>
+            <a:schemeClr val="bg1"/>
+          </a:solidFill>
+        </p:spPr>
+        <p:style>
+          <a:lnRef idx="2">
+            <a:schemeClr val="accent1">
+              <a:shade val="15000"/>
+            </a:schemeClr>
+          </a:lnRef>
+          <a:fillRef idx="1">
+            <a:schemeClr val="accent1"/>
+          </a:fillRef>
+          <a:effectRef idx="0">
+            <a:schemeClr val="accent1"/>
+          </a:effectRef>
+          <a:fontRef idx="minor">
+            <a:schemeClr val="lt1"/>
+          </a:fontRef>
+        </p:style>
+        <p:txBody>
+          <a:bodyPr rtlCol="0" anchor="ctr"/>
+          <a:lstStyle/>
+          <a:p>
+            <a:pPr algn="ctr"/>
+            <a:endParaRPr lang="en-SG" dirty="0"/>
+          </a:p>
+        </p:txBody>
+      </p:sp>
+      <p:sp>
+        <p:nvSpPr>
+          <p:cNvPr id="11" name="TextBox 10">
+            <a:extLst>
+              <a:ext uri="{FF2B5EF4-FFF2-40B4-BE49-F238E27FC236}">
+                <a16:creationId xmlns:a16="http://schemas.microsoft.com/office/drawing/2014/main" id="{B912D9FF-F2FA-078E-96AA-8F03E6ED5DF5}"/>
+              </a:ext>
+            </a:extLst>
+          </p:cNvPr>
+          <p:cNvSpPr txBox="1"/>
+          <p:nvPr/>
+        </p:nvSpPr>
+        <p:spPr>
+          <a:xfrm>
+            <a:off x="5142487" y="143268"/>
+            <a:ext cx="2496196" cy="461665"/>
+          </a:xfrm>
+          <a:prstGeom prst="rect">
+            <a:avLst/>
+          </a:prstGeom>
+          <a:noFill/>
+        </p:spPr>
+        <p:txBody>
+          <a:bodyPr wrap="none" rtlCol="0">
+            <a:spAutoFit/>
+          </a:bodyPr>
+          <a:lstStyle/>
+          <a:p>
             <a:r>
               <a:rPr lang="en-US" sz="2400" b="1" dirty="0"/>
-              <a:t>Client</a:t>
-            </a:r>
-            <a:endParaRPr lang="en-SG" sz="2400" b="1" dirty="0"/>
-          </a:p>
-        </p:txBody>
-      </p:sp>
+              <a:t>Model fine-tuning</a:t>
+            </a:r>
+          </a:p>
+        </p:txBody>
+      </p:sp>
+      <p:pic>
+        <p:nvPicPr>
+          <p:cNvPr id="1032" name="Picture 8" descr="HuggingFace Vector Logo - Download Free ...">
+            <a:extLst>
+              <a:ext uri="{FF2B5EF4-FFF2-40B4-BE49-F238E27FC236}">
+                <a16:creationId xmlns:a16="http://schemas.microsoft.com/office/drawing/2014/main" id="{B97843FE-7A8A-E54B-CE26-DB54D7497CBA}"/>
+              </a:ext>
+            </a:extLst>
+          </p:cNvPr>
+          <p:cNvPicPr>
+            <a:picLocks noChangeAspect="1" noChangeArrowheads="1"/>
+          </p:cNvPicPr>
+          <p:nvPr/>
+        </p:nvPicPr>
+        <p:blipFill>
+          <a:blip r:embed="rId5">
+            <a:extLst>
+              <a:ext uri="{28A0092B-C50C-407E-A947-70E740481C1C}">
+                <a14:useLocalDpi xmlns:a14="http://schemas.microsoft.com/office/drawing/2010/main" val="0"/>
+              </a:ext>
+            </a:extLst>
+          </a:blip>
+          <a:srcRect/>
+          <a:stretch>
+            <a:fillRect/>
+          </a:stretch>
+        </p:blipFill>
+        <p:spPr bwMode="auto">
+          <a:xfrm>
+            <a:off x="4848993" y="757829"/>
+            <a:ext cx="545011" cy="545011"/>
+          </a:xfrm>
+          <a:prstGeom prst="rect">
+            <a:avLst/>
+          </a:prstGeom>
+          <a:noFill/>
+          <a:extLst>
+            <a:ext uri="{909E8E84-426E-40DD-AFC4-6F175D3DCCD1}">
+              <a14:hiddenFill xmlns:a14="http://schemas.microsoft.com/office/drawing/2010/main">
+                <a:solidFill>
+                  <a:srgbClr val="FFFFFF"/>
+                </a:solidFill>
+              </a14:hiddenFill>
+            </a:ext>
+          </a:extLst>
+        </p:spPr>
+      </p:pic>
+      <p:pic>
+        <p:nvPicPr>
+          <p:cNvPr id="1034" name="Picture 10">
+            <a:extLst>
+              <a:ext uri="{FF2B5EF4-FFF2-40B4-BE49-F238E27FC236}">
+                <a16:creationId xmlns:a16="http://schemas.microsoft.com/office/drawing/2014/main" id="{2F3B8EF4-9CC1-D391-D576-06C105A66F78}"/>
+              </a:ext>
+            </a:extLst>
+          </p:cNvPr>
+          <p:cNvPicPr>
+            <a:picLocks noChangeAspect="1" noChangeArrowheads="1"/>
+          </p:cNvPicPr>
+          <p:nvPr/>
+        </p:nvPicPr>
+        <p:blipFill>
+          <a:blip r:embed="rId6">
+            <a:extLst>
+              <a:ext uri="{28A0092B-C50C-407E-A947-70E740481C1C}">
+                <a14:useLocalDpi xmlns:a14="http://schemas.microsoft.com/office/drawing/2010/main" val="0"/>
+              </a:ext>
+            </a:extLst>
+          </a:blip>
+          <a:srcRect/>
+          <a:stretch>
+            <a:fillRect/>
+          </a:stretch>
+        </p:blipFill>
+        <p:spPr bwMode="auto">
+          <a:xfrm>
+            <a:off x="5599601" y="823911"/>
+            <a:ext cx="653733" cy="402297"/>
+          </a:xfrm>
+          <a:prstGeom prst="rect">
+            <a:avLst/>
+          </a:prstGeom>
+          <a:noFill/>
+          <a:extLst>
+            <a:ext uri="{909E8E84-426E-40DD-AFC4-6F175D3DCCD1}">
+              <a14:hiddenFill xmlns:a14="http://schemas.microsoft.com/office/drawing/2010/main">
+                <a:solidFill>
+                  <a:srgbClr val="FFFFFF"/>
+                </a:solidFill>
+              </a14:hiddenFill>
+            </a:ext>
+          </a:extLst>
+        </p:spPr>
+      </p:pic>
+      <p:pic>
+        <p:nvPicPr>
+          <p:cNvPr id="12" name="Picture 4" descr="Amazon SageMaker SVG Logo | Free SVG logos &amp; icons download | SVGmix">
+            <a:extLst>
+              <a:ext uri="{FF2B5EF4-FFF2-40B4-BE49-F238E27FC236}">
+                <a16:creationId xmlns:a16="http://schemas.microsoft.com/office/drawing/2014/main" id="{8E147693-49B8-D764-3799-4D0FF4D72D18}"/>
+              </a:ext>
+            </a:extLst>
+          </p:cNvPr>
+          <p:cNvPicPr>
+            <a:picLocks noChangeAspect="1" noChangeArrowheads="1"/>
+          </p:cNvPicPr>
+          <p:nvPr/>
+        </p:nvPicPr>
+        <p:blipFill>
+          <a:blip r:embed="rId3">
+            <a:extLst>
+              <a:ext uri="{28A0092B-C50C-407E-A947-70E740481C1C}">
+                <a14:useLocalDpi xmlns:a14="http://schemas.microsoft.com/office/drawing/2010/main" val="0"/>
+              </a:ext>
+            </a:extLst>
+          </a:blip>
+          <a:srcRect/>
+          <a:stretch>
+            <a:fillRect/>
+          </a:stretch>
+        </p:blipFill>
+        <p:spPr bwMode="auto">
+          <a:xfrm>
+            <a:off x="7125768" y="745100"/>
+            <a:ext cx="545011" cy="545011"/>
+          </a:xfrm>
+          <a:prstGeom prst="rect">
+            <a:avLst/>
+          </a:prstGeom>
+          <a:noFill/>
+          <a:extLst>
+            <a:ext uri="{909E8E84-426E-40DD-AFC4-6F175D3DCCD1}">
+              <a14:hiddenFill xmlns:a14="http://schemas.microsoft.com/office/drawing/2010/main">
+                <a:solidFill>
+                  <a:srgbClr val="FFFFFF"/>
+                </a:solidFill>
+              </a14:hiddenFill>
+            </a:ext>
+          </a:extLst>
+        </p:spPr>
+      </p:pic>
+      <p:pic>
+        <p:nvPicPr>
+          <p:cNvPr id="1036" name="Picture 12" descr="Hello from RunPod Documentation ...">
+            <a:extLst>
+              <a:ext uri="{FF2B5EF4-FFF2-40B4-BE49-F238E27FC236}">
+                <a16:creationId xmlns:a16="http://schemas.microsoft.com/office/drawing/2014/main" id="{2945ED98-B3E1-AB28-9A64-3CEE5D783DB1}"/>
+              </a:ext>
+            </a:extLst>
+          </p:cNvPr>
+          <p:cNvPicPr>
+            <a:picLocks noChangeAspect="1" noChangeArrowheads="1"/>
+          </p:cNvPicPr>
+          <p:nvPr/>
+        </p:nvPicPr>
+        <p:blipFill>
+          <a:blip r:embed="rId7">
+            <a:extLst>
+              <a:ext uri="{28A0092B-C50C-407E-A947-70E740481C1C}">
+                <a14:useLocalDpi xmlns:a14="http://schemas.microsoft.com/office/drawing/2010/main" val="0"/>
+              </a:ext>
+            </a:extLst>
+          </a:blip>
+          <a:srcRect/>
+          <a:stretch>
+            <a:fillRect/>
+          </a:stretch>
+        </p:blipFill>
+        <p:spPr bwMode="auto">
+          <a:xfrm>
+            <a:off x="6386565" y="757829"/>
+            <a:ext cx="545012" cy="545012"/>
+          </a:xfrm>
+          <a:prstGeom prst="rect">
+            <a:avLst/>
+          </a:prstGeom>
+          <a:noFill/>
+          <a:extLst>
+            <a:ext uri="{909E8E84-426E-40DD-AFC4-6F175D3DCCD1}">
+              <a14:hiddenFill xmlns:a14="http://schemas.microsoft.com/office/drawing/2010/main">
+                <a:solidFill>
+                  <a:srgbClr val="FFFFFF"/>
+                </a:solidFill>
+              </a14:hiddenFill>
+            </a:ext>
+          </a:extLst>
+        </p:spPr>
+      </p:pic>
       <p:cxnSp>
         <p:nvCxnSpPr>
-          <p:cNvPr id="6" name="Straight Arrow Connector 5">
-            <a:extLst>
-              <a:ext uri="{FF2B5EF4-FFF2-40B4-BE49-F238E27FC236}">
-                <a16:creationId xmlns:a16="http://schemas.microsoft.com/office/drawing/2014/main" id="{5C31F4B8-3137-6D25-5CCD-E5EAF07CD482}"/>
-              </a:ext>
-            </a:extLst>
-          </p:cNvPr>
-          <p:cNvCxnSpPr/>
+          <p:cNvPr id="16" name="Straight Arrow Connector 15">
+            <a:extLst>
+              <a:ext uri="{FF2B5EF4-FFF2-40B4-BE49-F238E27FC236}">
+                <a16:creationId xmlns:a16="http://schemas.microsoft.com/office/drawing/2014/main" id="{89BE233A-46B5-52A1-A9CA-BE1AACC65FA8}"/>
+              </a:ext>
+            </a:extLst>
+          </p:cNvPr>
+          <p:cNvCxnSpPr>
+            <a:cxnSpLocks/>
+          </p:cNvCxnSpPr>
           <p:nvPr/>
         </p:nvCxnSpPr>
         <p:spPr>
           <a:xfrm>
-            <a:off x="2815949" y="2849749"/>
-            <a:ext cx="1696720" cy="0"/>
+            <a:off x="6335765" y="3032188"/>
+            <a:ext cx="0" cy="370211"/>
           </a:xfrm>
           <a:prstGeom prst="straightConnector1">
             <a:avLst/>
           </a:prstGeom>
           <a:ln w="66675">
             <a:solidFill>
-              <a:srgbClr val="00B050"/>
+              <a:schemeClr val="accent1"/>
             </a:solidFill>
             <a:tailEnd type="triangle"/>
           </a:ln>
@@ -3695,10 +4085,10 @@
       </p:cxnSp>
       <p:cxnSp>
         <p:nvCxnSpPr>
-          <p:cNvPr id="7" name="Straight Arrow Connector 6">
-            <a:extLst>
-              <a:ext uri="{FF2B5EF4-FFF2-40B4-BE49-F238E27FC236}">
-                <a16:creationId xmlns:a16="http://schemas.microsoft.com/office/drawing/2014/main" id="{8D952D50-13DF-BDA1-8B9A-3380D45DC60A}"/>
+          <p:cNvPr id="18" name="Straight Arrow Connector 17">
+            <a:extLst>
+              <a:ext uri="{FF2B5EF4-FFF2-40B4-BE49-F238E27FC236}">
+                <a16:creationId xmlns:a16="http://schemas.microsoft.com/office/drawing/2014/main" id="{05B9E6A2-045A-E7F9-3E44-AAA20E367154}"/>
               </a:ext>
             </a:extLst>
           </p:cNvPr>
@@ -3708,16 +4098,16 @@
           <p:nvPr/>
         </p:nvCxnSpPr>
         <p:spPr>
-          <a:xfrm flipH="1">
-            <a:off x="2806324" y="3429000"/>
-            <a:ext cx="1696720" cy="0"/>
+          <a:xfrm>
+            <a:off x="6276835" y="1430789"/>
+            <a:ext cx="0" cy="370211"/>
           </a:xfrm>
           <a:prstGeom prst="straightConnector1">
             <a:avLst/>
           </a:prstGeom>
           <a:ln w="66675">
             <a:solidFill>
-              <a:srgbClr val="00B050"/>
+              <a:schemeClr val="accent1"/>
             </a:solidFill>
             <a:tailEnd type="triangle"/>
           </a:ln>
@@ -3737,795 +4127,34 @@
           </a:fontRef>
         </p:style>
       </p:cxnSp>
-      <p:sp>
-        <p:nvSpPr>
-          <p:cNvPr id="10" name="TextBox 9">
-            <a:extLst>
-              <a:ext uri="{FF2B5EF4-FFF2-40B4-BE49-F238E27FC236}">
-                <a16:creationId xmlns:a16="http://schemas.microsoft.com/office/drawing/2014/main" id="{84F13D63-06DE-F578-F45A-E277DC095F94}"/>
-              </a:ext>
-            </a:extLst>
-          </p:cNvPr>
-          <p:cNvSpPr txBox="1"/>
-          <p:nvPr/>
-        </p:nvSpPr>
-        <p:spPr>
-          <a:xfrm>
-            <a:off x="2698546" y="2895506"/>
-            <a:ext cx="1893532" cy="461665"/>
-          </a:xfrm>
-          <a:prstGeom prst="rect">
-            <a:avLst/>
-          </a:prstGeom>
-          <a:noFill/>
-        </p:spPr>
-        <p:txBody>
-          <a:bodyPr wrap="none" rtlCol="0">
-            <a:spAutoFit/>
-          </a:bodyPr>
-          <a:lstStyle/>
-          <a:p>
-            <a:r>
-              <a:rPr lang="en-US" sz="2400" b="1" dirty="0"/>
-              <a:t>HTTP request</a:t>
-            </a:r>
-            <a:endParaRPr lang="en-SG" sz="2400" b="1" dirty="0"/>
-          </a:p>
-        </p:txBody>
-      </p:sp>
-      <p:sp>
-        <p:nvSpPr>
-          <p:cNvPr id="11" name="Rectangle: Rounded Corners 10">
-            <a:extLst>
-              <a:ext uri="{FF2B5EF4-FFF2-40B4-BE49-F238E27FC236}">
-                <a16:creationId xmlns:a16="http://schemas.microsoft.com/office/drawing/2014/main" id="{632B9A35-326C-FE79-D761-378E26D8706B}"/>
-              </a:ext>
-            </a:extLst>
-          </p:cNvPr>
-          <p:cNvSpPr/>
-          <p:nvPr/>
-        </p:nvSpPr>
-        <p:spPr>
-          <a:xfrm>
-            <a:off x="6777587" y="-194823"/>
-            <a:ext cx="5926489" cy="3981914"/>
-          </a:xfrm>
-          <a:prstGeom prst="roundRect">
-            <a:avLst/>
-          </a:prstGeom>
-          <a:solidFill>
-            <a:schemeClr val="accent6">
-              <a:lumMod val="40000"/>
-              <a:lumOff val="60000"/>
-            </a:schemeClr>
-          </a:solidFill>
-        </p:spPr>
-        <p:style>
-          <a:lnRef idx="2">
-            <a:schemeClr val="accent1">
-              <a:shade val="15000"/>
-            </a:schemeClr>
-          </a:lnRef>
-          <a:fillRef idx="1">
-            <a:schemeClr val="accent1"/>
-          </a:fillRef>
-          <a:effectRef idx="0">
-            <a:schemeClr val="accent1"/>
-          </a:effectRef>
-          <a:fontRef idx="minor">
-            <a:schemeClr val="lt1"/>
-          </a:fontRef>
-        </p:style>
-        <p:txBody>
-          <a:bodyPr rtlCol="0" anchor="ctr"/>
-          <a:lstStyle/>
-          <a:p>
-            <a:pPr algn="ctr"/>
-            <a:endParaRPr lang="en-SG" dirty="0"/>
-          </a:p>
-        </p:txBody>
-      </p:sp>
-      <p:pic>
-        <p:nvPicPr>
-          <p:cNvPr id="13" name="Picture 12">
-            <a:extLst>
-              <a:ext uri="{FF2B5EF4-FFF2-40B4-BE49-F238E27FC236}">
-                <a16:creationId xmlns:a16="http://schemas.microsoft.com/office/drawing/2014/main" id="{07DECA80-DC2E-57BB-88F5-BA4EF75821EF}"/>
-              </a:ext>
-            </a:extLst>
-          </p:cNvPr>
-          <p:cNvPicPr>
-            <a:picLocks noChangeAspect="1"/>
-          </p:cNvPicPr>
-          <p:nvPr/>
-        </p:nvPicPr>
-        <p:blipFill>
-          <a:blip r:embed="rId2">
-            <a:extLst>
-              <a:ext uri="{28A0092B-C50C-407E-A947-70E740481C1C}">
-                <a14:useLocalDpi xmlns:a14="http://schemas.microsoft.com/office/drawing/2010/main" val="0"/>
-              </a:ext>
-            </a:extLst>
-          </a:blip>
-          <a:stretch>
-            <a:fillRect/>
-          </a:stretch>
-        </p:blipFill>
-        <p:spPr>
-          <a:xfrm>
-            <a:off x="8046720" y="4634578"/>
-            <a:ext cx="1722921" cy="392024"/>
-          </a:xfrm>
-          <a:prstGeom prst="rect">
-            <a:avLst/>
-          </a:prstGeom>
-        </p:spPr>
-      </p:pic>
-      <p:sp>
-        <p:nvSpPr>
-          <p:cNvPr id="14" name="TextBox 13">
-            <a:extLst>
-              <a:ext uri="{FF2B5EF4-FFF2-40B4-BE49-F238E27FC236}">
-                <a16:creationId xmlns:a16="http://schemas.microsoft.com/office/drawing/2014/main" id="{2F581DE4-747C-2E39-7AC2-D43540357F1B}"/>
-              </a:ext>
-            </a:extLst>
-          </p:cNvPr>
-          <p:cNvSpPr txBox="1"/>
-          <p:nvPr/>
-        </p:nvSpPr>
-        <p:spPr>
-          <a:xfrm>
-            <a:off x="5597488" y="4591278"/>
-            <a:ext cx="2360198" cy="461665"/>
-          </a:xfrm>
-          <a:prstGeom prst="rect">
-            <a:avLst/>
-          </a:prstGeom>
-          <a:noFill/>
-        </p:spPr>
-        <p:txBody>
-          <a:bodyPr wrap="none" rtlCol="0">
-            <a:spAutoFit/>
-          </a:bodyPr>
-          <a:lstStyle/>
-          <a:p>
-            <a:r>
-              <a:rPr lang="en-US" sz="2400" b="1" dirty="0"/>
-              <a:t>Docker container</a:t>
-            </a:r>
-            <a:endParaRPr lang="en-SG" sz="2400" b="1" dirty="0"/>
-          </a:p>
-        </p:txBody>
-      </p:sp>
-      <p:sp>
-        <p:nvSpPr>
-          <p:cNvPr id="15" name="TextBox 14">
-            <a:extLst>
-              <a:ext uri="{FF2B5EF4-FFF2-40B4-BE49-F238E27FC236}">
-                <a16:creationId xmlns:a16="http://schemas.microsoft.com/office/drawing/2014/main" id="{D5275FB5-13D4-26E1-751C-20FE0B2AE187}"/>
-              </a:ext>
-            </a:extLst>
-          </p:cNvPr>
-          <p:cNvSpPr txBox="1"/>
-          <p:nvPr/>
-        </p:nvSpPr>
-        <p:spPr>
-          <a:xfrm>
-            <a:off x="6883222" y="1434181"/>
-            <a:ext cx="1882054" cy="461665"/>
-          </a:xfrm>
-          <a:prstGeom prst="rect">
-            <a:avLst/>
-          </a:prstGeom>
-          <a:noFill/>
-        </p:spPr>
-        <p:txBody>
-          <a:bodyPr wrap="none" rtlCol="0">
-            <a:spAutoFit/>
-          </a:bodyPr>
-          <a:lstStyle/>
-          <a:p>
-            <a:r>
-              <a:rPr lang="en-US" sz="2400" b="1" dirty="0"/>
-              <a:t>Model server</a:t>
-            </a:r>
-            <a:endParaRPr lang="en-SG" sz="2400" b="1" dirty="0"/>
-          </a:p>
-        </p:txBody>
-      </p:sp>
-      <p:sp>
-        <p:nvSpPr>
-          <p:cNvPr id="16" name="TextBox 15">
-            <a:extLst>
-              <a:ext uri="{FF2B5EF4-FFF2-40B4-BE49-F238E27FC236}">
-                <a16:creationId xmlns:a16="http://schemas.microsoft.com/office/drawing/2014/main" id="{D19AD3FF-F79B-5DCA-4AD1-D805405CE681}"/>
-              </a:ext>
-            </a:extLst>
-          </p:cNvPr>
-          <p:cNvSpPr txBox="1"/>
-          <p:nvPr/>
-        </p:nvSpPr>
-        <p:spPr>
-          <a:xfrm>
-            <a:off x="5597488" y="3567223"/>
-            <a:ext cx="824265" cy="461665"/>
-          </a:xfrm>
-          <a:prstGeom prst="rect">
-            <a:avLst/>
-          </a:prstGeom>
-          <a:noFill/>
-        </p:spPr>
-        <p:txBody>
-          <a:bodyPr wrap="none" rtlCol="0">
-            <a:spAutoFit/>
-          </a:bodyPr>
-          <a:lstStyle/>
-          <a:p>
-            <a:r>
-              <a:rPr lang="en-US" sz="2400" b="1" dirty="0"/>
-              <a:t>Flask</a:t>
-            </a:r>
-            <a:endParaRPr lang="en-SG" sz="2400" b="1" dirty="0"/>
-          </a:p>
-        </p:txBody>
-      </p:sp>
-      <p:pic>
-        <p:nvPicPr>
-          <p:cNvPr id="18" name="Picture 17">
-            <a:extLst>
-              <a:ext uri="{FF2B5EF4-FFF2-40B4-BE49-F238E27FC236}">
-                <a16:creationId xmlns:a16="http://schemas.microsoft.com/office/drawing/2014/main" id="{A683FDBC-B3E3-2170-4BF7-3BF79169F4EE}"/>
-              </a:ext>
-            </a:extLst>
-          </p:cNvPr>
-          <p:cNvPicPr>
-            <a:picLocks noChangeAspect="1"/>
-          </p:cNvPicPr>
-          <p:nvPr/>
-        </p:nvPicPr>
-        <p:blipFill>
-          <a:blip r:embed="rId3"/>
-          <a:stretch>
-            <a:fillRect/>
-          </a:stretch>
-        </p:blipFill>
-        <p:spPr>
-          <a:xfrm>
-            <a:off x="5374664" y="2331942"/>
-            <a:ext cx="1160835" cy="1160835"/>
-          </a:xfrm>
-          <a:prstGeom prst="rect">
-            <a:avLst/>
-          </a:prstGeom>
-        </p:spPr>
-      </p:pic>
-      <p:sp>
-        <p:nvSpPr>
-          <p:cNvPr id="19" name="TextBox 18">
-            <a:extLst>
-              <a:ext uri="{FF2B5EF4-FFF2-40B4-BE49-F238E27FC236}">
-                <a16:creationId xmlns:a16="http://schemas.microsoft.com/office/drawing/2014/main" id="{BB8CF8EF-6D4A-3782-2352-DD1BA274E03F}"/>
-              </a:ext>
-            </a:extLst>
-          </p:cNvPr>
-          <p:cNvSpPr txBox="1"/>
-          <p:nvPr/>
-        </p:nvSpPr>
-        <p:spPr>
-          <a:xfrm>
-            <a:off x="6930084" y="3479086"/>
-            <a:ext cx="3590023" cy="830997"/>
-          </a:xfrm>
-          <a:prstGeom prst="rect">
-            <a:avLst/>
-          </a:prstGeom>
-          <a:noFill/>
-        </p:spPr>
-        <p:txBody>
-          <a:bodyPr wrap="square" rtlCol="0">
-            <a:spAutoFit/>
-          </a:bodyPr>
-          <a:lstStyle/>
-          <a:p>
-            <a:pPr algn="ctr"/>
-            <a:r>
-              <a:rPr lang="en-US" sz="2400" b="1" dirty="0"/>
-              <a:t>Random Forest </a:t>
-            </a:r>
-          </a:p>
-          <a:p>
-            <a:pPr algn="ctr"/>
-            <a:r>
-              <a:rPr lang="en-US" sz="2400" b="1" dirty="0"/>
-              <a:t>model </a:t>
-            </a:r>
-            <a:endParaRPr lang="en-SG" sz="2400" b="1" dirty="0"/>
-          </a:p>
-        </p:txBody>
-      </p:sp>
-      <p:sp>
-        <p:nvSpPr>
-          <p:cNvPr id="22" name="Oval 21">
-            <a:extLst>
-              <a:ext uri="{FF2B5EF4-FFF2-40B4-BE49-F238E27FC236}">
-                <a16:creationId xmlns:a16="http://schemas.microsoft.com/office/drawing/2014/main" id="{3E182787-D5A6-B33A-D98E-E025BA4478E6}"/>
-              </a:ext>
-            </a:extLst>
-          </p:cNvPr>
-          <p:cNvSpPr/>
-          <p:nvPr/>
-        </p:nvSpPr>
-        <p:spPr>
-          <a:xfrm>
-            <a:off x="8203164" y="2307376"/>
-            <a:ext cx="99962" cy="94147"/>
-          </a:xfrm>
-          <a:prstGeom prst="ellipse">
-            <a:avLst/>
-          </a:prstGeom>
-        </p:spPr>
-        <p:style>
-          <a:lnRef idx="2">
-            <a:schemeClr val="accent1">
-              <a:shade val="15000"/>
-            </a:schemeClr>
-          </a:lnRef>
-          <a:fillRef idx="1">
-            <a:schemeClr val="accent1"/>
-          </a:fillRef>
-          <a:effectRef idx="0">
-            <a:schemeClr val="accent1"/>
-          </a:effectRef>
-          <a:fontRef idx="minor">
-            <a:schemeClr val="lt1"/>
-          </a:fontRef>
-        </p:style>
-        <p:txBody>
-          <a:bodyPr rtlCol="0" anchor="ctr"/>
-          <a:lstStyle/>
-          <a:p>
-            <a:pPr algn="ctr"/>
-            <a:endParaRPr lang="en-SG"/>
-          </a:p>
-        </p:txBody>
-      </p:sp>
-      <p:sp>
-        <p:nvSpPr>
-          <p:cNvPr id="23" name="Oval 22">
-            <a:extLst>
-              <a:ext uri="{FF2B5EF4-FFF2-40B4-BE49-F238E27FC236}">
-                <a16:creationId xmlns:a16="http://schemas.microsoft.com/office/drawing/2014/main" id="{CD0917ED-26BB-F69F-CB92-EE05B6277432}"/>
-              </a:ext>
-            </a:extLst>
-          </p:cNvPr>
-          <p:cNvSpPr/>
-          <p:nvPr/>
-        </p:nvSpPr>
-        <p:spPr>
-          <a:xfrm>
-            <a:off x="8476114" y="2512925"/>
-            <a:ext cx="99962" cy="94147"/>
-          </a:xfrm>
-          <a:prstGeom prst="ellipse">
-            <a:avLst/>
-          </a:prstGeom>
-        </p:spPr>
-        <p:style>
-          <a:lnRef idx="2">
-            <a:schemeClr val="accent1">
-              <a:shade val="15000"/>
-            </a:schemeClr>
-          </a:lnRef>
-          <a:fillRef idx="1">
-            <a:schemeClr val="accent1"/>
-          </a:fillRef>
-          <a:effectRef idx="0">
-            <a:schemeClr val="accent1"/>
-          </a:effectRef>
-          <a:fontRef idx="minor">
-            <a:schemeClr val="lt1"/>
-          </a:fontRef>
-        </p:style>
-        <p:txBody>
-          <a:bodyPr rtlCol="0" anchor="ctr"/>
-          <a:lstStyle/>
-          <a:p>
-            <a:pPr algn="ctr"/>
-            <a:endParaRPr lang="en-SG"/>
-          </a:p>
-        </p:txBody>
-      </p:sp>
-      <p:sp>
-        <p:nvSpPr>
-          <p:cNvPr id="24" name="Oval 23">
-            <a:extLst>
-              <a:ext uri="{FF2B5EF4-FFF2-40B4-BE49-F238E27FC236}">
-                <a16:creationId xmlns:a16="http://schemas.microsoft.com/office/drawing/2014/main" id="{B333C6C0-5B8B-8C1B-A50D-7860BAF0276A}"/>
-              </a:ext>
-            </a:extLst>
-          </p:cNvPr>
-          <p:cNvSpPr/>
-          <p:nvPr/>
-        </p:nvSpPr>
-        <p:spPr>
-          <a:xfrm>
-            <a:off x="7964003" y="2512926"/>
-            <a:ext cx="99962" cy="94147"/>
-          </a:xfrm>
-          <a:prstGeom prst="ellipse">
-            <a:avLst/>
-          </a:prstGeom>
-        </p:spPr>
-        <p:style>
-          <a:lnRef idx="2">
-            <a:schemeClr val="accent1">
-              <a:shade val="15000"/>
-            </a:schemeClr>
-          </a:lnRef>
-          <a:fillRef idx="1">
-            <a:schemeClr val="accent1"/>
-          </a:fillRef>
-          <a:effectRef idx="0">
-            <a:schemeClr val="accent1"/>
-          </a:effectRef>
-          <a:fontRef idx="minor">
-            <a:schemeClr val="lt1"/>
-          </a:fontRef>
-        </p:style>
-        <p:txBody>
-          <a:bodyPr rtlCol="0" anchor="ctr"/>
-          <a:lstStyle/>
-          <a:p>
-            <a:pPr algn="ctr"/>
-            <a:endParaRPr lang="en-SG"/>
-          </a:p>
-        </p:txBody>
-      </p:sp>
-      <p:sp>
-        <p:nvSpPr>
-          <p:cNvPr id="25" name="Oval 24">
-            <a:extLst>
-              <a:ext uri="{FF2B5EF4-FFF2-40B4-BE49-F238E27FC236}">
-                <a16:creationId xmlns:a16="http://schemas.microsoft.com/office/drawing/2014/main" id="{09C11240-CE16-73EC-9CE0-190066076CED}"/>
-              </a:ext>
-            </a:extLst>
-          </p:cNvPr>
-          <p:cNvSpPr/>
-          <p:nvPr/>
-        </p:nvSpPr>
-        <p:spPr>
-          <a:xfrm>
-            <a:off x="8203164" y="2728022"/>
-            <a:ext cx="99962" cy="94147"/>
-          </a:xfrm>
-          <a:prstGeom prst="ellipse">
-            <a:avLst/>
-          </a:prstGeom>
-        </p:spPr>
-        <p:style>
-          <a:lnRef idx="2">
-            <a:schemeClr val="accent1">
-              <a:shade val="15000"/>
-            </a:schemeClr>
-          </a:lnRef>
-          <a:fillRef idx="1">
-            <a:schemeClr val="accent1"/>
-          </a:fillRef>
-          <a:effectRef idx="0">
-            <a:schemeClr val="accent1"/>
-          </a:effectRef>
-          <a:fontRef idx="minor">
-            <a:schemeClr val="lt1"/>
-          </a:fontRef>
-        </p:style>
-        <p:txBody>
-          <a:bodyPr rtlCol="0" anchor="ctr"/>
-          <a:lstStyle/>
-          <a:p>
-            <a:pPr algn="ctr"/>
-            <a:endParaRPr lang="en-SG"/>
-          </a:p>
-        </p:txBody>
-      </p:sp>
-      <p:sp>
-        <p:nvSpPr>
-          <p:cNvPr id="26" name="Oval 25">
-            <a:extLst>
-              <a:ext uri="{FF2B5EF4-FFF2-40B4-BE49-F238E27FC236}">
-                <a16:creationId xmlns:a16="http://schemas.microsoft.com/office/drawing/2014/main" id="{157781ED-10D8-ADD7-3917-98D8AFE7A774}"/>
-              </a:ext>
-            </a:extLst>
-          </p:cNvPr>
-          <p:cNvSpPr/>
-          <p:nvPr/>
-        </p:nvSpPr>
-        <p:spPr>
-          <a:xfrm>
-            <a:off x="7774268" y="2849141"/>
-            <a:ext cx="99962" cy="94147"/>
-          </a:xfrm>
-          <a:prstGeom prst="ellipse">
-            <a:avLst/>
-          </a:prstGeom>
-        </p:spPr>
-        <p:style>
-          <a:lnRef idx="2">
-            <a:schemeClr val="accent1">
-              <a:shade val="15000"/>
-            </a:schemeClr>
-          </a:lnRef>
-          <a:fillRef idx="1">
-            <a:schemeClr val="accent1"/>
-          </a:fillRef>
-          <a:effectRef idx="0">
-            <a:schemeClr val="accent1"/>
-          </a:effectRef>
-          <a:fontRef idx="minor">
-            <a:schemeClr val="lt1"/>
-          </a:fontRef>
-        </p:style>
-        <p:txBody>
-          <a:bodyPr rtlCol="0" anchor="ctr"/>
-          <a:lstStyle/>
-          <a:p>
-            <a:pPr algn="ctr"/>
-            <a:endParaRPr lang="en-SG"/>
-          </a:p>
-        </p:txBody>
-      </p:sp>
-      <p:sp>
-        <p:nvSpPr>
-          <p:cNvPr id="27" name="Oval 26">
-            <a:extLst>
-              <a:ext uri="{FF2B5EF4-FFF2-40B4-BE49-F238E27FC236}">
-                <a16:creationId xmlns:a16="http://schemas.microsoft.com/office/drawing/2014/main" id="{6D66FAEE-5F87-B0FF-83AD-D9165B320DB5}"/>
-              </a:ext>
-            </a:extLst>
-          </p:cNvPr>
-          <p:cNvSpPr/>
-          <p:nvPr/>
-        </p:nvSpPr>
-        <p:spPr>
-          <a:xfrm>
-            <a:off x="7622587" y="3094344"/>
-            <a:ext cx="99962" cy="94147"/>
-          </a:xfrm>
-          <a:prstGeom prst="ellipse">
-            <a:avLst/>
-          </a:prstGeom>
-        </p:spPr>
-        <p:style>
-          <a:lnRef idx="2">
-            <a:schemeClr val="accent1">
-              <a:shade val="15000"/>
-            </a:schemeClr>
-          </a:lnRef>
-          <a:fillRef idx="1">
-            <a:schemeClr val="accent1"/>
-          </a:fillRef>
-          <a:effectRef idx="0">
-            <a:schemeClr val="accent1"/>
-          </a:effectRef>
-          <a:fontRef idx="minor">
-            <a:schemeClr val="lt1"/>
-          </a:fontRef>
-        </p:style>
-        <p:txBody>
-          <a:bodyPr rtlCol="0" anchor="ctr"/>
-          <a:lstStyle/>
-          <a:p>
-            <a:pPr algn="ctr"/>
-            <a:endParaRPr lang="en-SG"/>
-          </a:p>
-        </p:txBody>
-      </p:sp>
-      <p:sp>
-        <p:nvSpPr>
-          <p:cNvPr id="28" name="Oval 27">
-            <a:extLst>
-              <a:ext uri="{FF2B5EF4-FFF2-40B4-BE49-F238E27FC236}">
-                <a16:creationId xmlns:a16="http://schemas.microsoft.com/office/drawing/2014/main" id="{696B1573-646F-73F2-F2B9-D6CEB41AE003}"/>
-              </a:ext>
-            </a:extLst>
-          </p:cNvPr>
-          <p:cNvSpPr/>
-          <p:nvPr/>
-        </p:nvSpPr>
-        <p:spPr>
-          <a:xfrm>
-            <a:off x="7900617" y="3104794"/>
-            <a:ext cx="99962" cy="94147"/>
-          </a:xfrm>
-          <a:prstGeom prst="ellipse">
-            <a:avLst/>
-          </a:prstGeom>
-        </p:spPr>
-        <p:style>
-          <a:lnRef idx="2">
-            <a:schemeClr val="accent1">
-              <a:shade val="15000"/>
-            </a:schemeClr>
-          </a:lnRef>
-          <a:fillRef idx="1">
-            <a:schemeClr val="accent1"/>
-          </a:fillRef>
-          <a:effectRef idx="0">
-            <a:schemeClr val="accent1"/>
-          </a:effectRef>
-          <a:fontRef idx="minor">
-            <a:schemeClr val="lt1"/>
-          </a:fontRef>
-        </p:style>
-        <p:txBody>
-          <a:bodyPr rtlCol="0" anchor="ctr"/>
-          <a:lstStyle/>
-          <a:p>
-            <a:pPr algn="ctr"/>
-            <a:endParaRPr lang="en-SG"/>
-          </a:p>
-        </p:txBody>
-      </p:sp>
-      <p:sp>
-        <p:nvSpPr>
-          <p:cNvPr id="29" name="Oval 28">
-            <a:extLst>
-              <a:ext uri="{FF2B5EF4-FFF2-40B4-BE49-F238E27FC236}">
-                <a16:creationId xmlns:a16="http://schemas.microsoft.com/office/drawing/2014/main" id="{8364A2D6-4BBA-4AEC-87CB-50BA0B4DDD9D}"/>
-              </a:ext>
-            </a:extLst>
-          </p:cNvPr>
-          <p:cNvSpPr/>
-          <p:nvPr/>
-        </p:nvSpPr>
-        <p:spPr>
-          <a:xfrm>
-            <a:off x="8476114" y="2911368"/>
-            <a:ext cx="99962" cy="94147"/>
-          </a:xfrm>
-          <a:prstGeom prst="ellipse">
-            <a:avLst/>
-          </a:prstGeom>
-        </p:spPr>
-        <p:style>
-          <a:lnRef idx="2">
-            <a:schemeClr val="accent1">
-              <a:shade val="15000"/>
-            </a:schemeClr>
-          </a:lnRef>
-          <a:fillRef idx="1">
-            <a:schemeClr val="accent1"/>
-          </a:fillRef>
-          <a:effectRef idx="0">
-            <a:schemeClr val="accent1"/>
-          </a:effectRef>
-          <a:fontRef idx="minor">
-            <a:schemeClr val="lt1"/>
-          </a:fontRef>
-        </p:style>
-        <p:txBody>
-          <a:bodyPr rtlCol="0" anchor="ctr"/>
-          <a:lstStyle/>
-          <a:p>
-            <a:pPr algn="ctr"/>
-            <a:endParaRPr lang="en-SG"/>
-          </a:p>
-        </p:txBody>
-      </p:sp>
-      <p:sp>
-        <p:nvSpPr>
-          <p:cNvPr id="30" name="Oval 29">
-            <a:extLst>
-              <a:ext uri="{FF2B5EF4-FFF2-40B4-BE49-F238E27FC236}">
-                <a16:creationId xmlns:a16="http://schemas.microsoft.com/office/drawing/2014/main" id="{27CB1B66-7DB7-3A94-6361-C0946A7A3301}"/>
-              </a:ext>
-            </a:extLst>
-          </p:cNvPr>
-          <p:cNvSpPr/>
-          <p:nvPr/>
-        </p:nvSpPr>
-        <p:spPr>
-          <a:xfrm>
-            <a:off x="8329674" y="3149698"/>
-            <a:ext cx="99962" cy="94147"/>
-          </a:xfrm>
-          <a:prstGeom prst="ellipse">
-            <a:avLst/>
-          </a:prstGeom>
-        </p:spPr>
-        <p:style>
-          <a:lnRef idx="2">
-            <a:schemeClr val="accent1">
-              <a:shade val="15000"/>
-            </a:schemeClr>
-          </a:lnRef>
-          <a:fillRef idx="1">
-            <a:schemeClr val="accent1"/>
-          </a:fillRef>
-          <a:effectRef idx="0">
-            <a:schemeClr val="accent1"/>
-          </a:effectRef>
-          <a:fontRef idx="minor">
-            <a:schemeClr val="lt1"/>
-          </a:fontRef>
-        </p:style>
-        <p:txBody>
-          <a:bodyPr rtlCol="0" anchor="ctr"/>
-          <a:lstStyle/>
-          <a:p>
-            <a:pPr algn="ctr"/>
-            <a:endParaRPr lang="en-SG"/>
-          </a:p>
-        </p:txBody>
-      </p:sp>
-      <p:sp>
-        <p:nvSpPr>
-          <p:cNvPr id="31" name="Oval 30">
-            <a:extLst>
-              <a:ext uri="{FF2B5EF4-FFF2-40B4-BE49-F238E27FC236}">
-                <a16:creationId xmlns:a16="http://schemas.microsoft.com/office/drawing/2014/main" id="{DB8D76E7-F76C-972A-18AC-037563C36991}"/>
-              </a:ext>
-            </a:extLst>
-          </p:cNvPr>
-          <p:cNvSpPr/>
-          <p:nvPr/>
-        </p:nvSpPr>
-        <p:spPr>
-          <a:xfrm>
-            <a:off x="8638386" y="3157748"/>
-            <a:ext cx="99962" cy="94147"/>
-          </a:xfrm>
-          <a:prstGeom prst="ellipse">
-            <a:avLst/>
-          </a:prstGeom>
-        </p:spPr>
-        <p:style>
-          <a:lnRef idx="2">
-            <a:schemeClr val="accent1">
-              <a:shade val="15000"/>
-            </a:schemeClr>
-          </a:lnRef>
-          <a:fillRef idx="1">
-            <a:schemeClr val="accent1"/>
-          </a:fillRef>
-          <a:effectRef idx="0">
-            <a:schemeClr val="accent1"/>
-          </a:effectRef>
-          <a:fontRef idx="minor">
-            <a:schemeClr val="lt1"/>
-          </a:fontRef>
-        </p:style>
-        <p:txBody>
-          <a:bodyPr rtlCol="0" anchor="ctr"/>
-          <a:lstStyle/>
-          <a:p>
-            <a:pPr algn="ctr"/>
-            <a:endParaRPr lang="en-SG"/>
-          </a:p>
-        </p:txBody>
-      </p:sp>
       <p:cxnSp>
         <p:nvCxnSpPr>
-          <p:cNvPr id="33" name="Straight Connector 32">
-            <a:extLst>
-              <a:ext uri="{FF2B5EF4-FFF2-40B4-BE49-F238E27FC236}">
-                <a16:creationId xmlns:a16="http://schemas.microsoft.com/office/drawing/2014/main" id="{F2F0DBDD-7AA3-0656-7D3F-6BFB10D62C74}"/>
+          <p:cNvPr id="19" name="Straight Arrow Connector 18">
+            <a:extLst>
+              <a:ext uri="{FF2B5EF4-FFF2-40B4-BE49-F238E27FC236}">
+                <a16:creationId xmlns:a16="http://schemas.microsoft.com/office/drawing/2014/main" id="{3239F040-B441-D5DE-E9D5-621B3D493EDC}"/>
               </a:ext>
             </a:extLst>
           </p:cNvPr>
           <p:cNvCxnSpPr>
             <a:cxnSpLocks/>
-            <a:endCxn id="25" idx="0"/>
           </p:cNvCxnSpPr>
           <p:nvPr/>
         </p:nvCxnSpPr>
         <p:spPr>
           <a:xfrm>
-            <a:off x="8253145" y="2407873"/>
-            <a:ext cx="0" cy="320149"/>
+            <a:off x="6335765" y="5041769"/>
+            <a:ext cx="0" cy="370211"/>
           </a:xfrm>
-          <a:prstGeom prst="line">
+          <a:prstGeom prst="straightConnector1">
             <a:avLst/>
           </a:prstGeom>
+          <a:ln w="66675">
+            <a:solidFill>
+              <a:schemeClr val="accent1"/>
+            </a:solidFill>
+            <a:tailEnd type="triangle"/>
+          </a:ln>
         </p:spPr>
         <p:style>
           <a:lnRef idx="1">
@@ -4542,364 +4171,10 @@
           </a:fontRef>
         </p:style>
       </p:cxnSp>
-      <p:cxnSp>
-        <p:nvCxnSpPr>
-          <p:cNvPr id="36" name="Straight Connector 35">
-            <a:extLst>
-              <a:ext uri="{FF2B5EF4-FFF2-40B4-BE49-F238E27FC236}">
-                <a16:creationId xmlns:a16="http://schemas.microsoft.com/office/drawing/2014/main" id="{73AF0226-6C51-8FF2-DE4F-43020D214A31}"/>
-              </a:ext>
-            </a:extLst>
-          </p:cNvPr>
-          <p:cNvCxnSpPr>
-            <a:stCxn id="22" idx="3"/>
-            <a:endCxn id="24" idx="7"/>
-          </p:cNvCxnSpPr>
-          <p:nvPr/>
-        </p:nvCxnSpPr>
-        <p:spPr>
-          <a:xfrm flipH="1">
-            <a:off x="8049326" y="2387735"/>
-            <a:ext cx="168477" cy="138979"/>
-          </a:xfrm>
-          <a:prstGeom prst="line">
-            <a:avLst/>
-          </a:prstGeom>
-        </p:spPr>
-        <p:style>
-          <a:lnRef idx="1">
-            <a:schemeClr val="accent1"/>
-          </a:lnRef>
-          <a:fillRef idx="0">
-            <a:schemeClr val="accent1"/>
-          </a:fillRef>
-          <a:effectRef idx="0">
-            <a:schemeClr val="accent1"/>
-          </a:effectRef>
-          <a:fontRef idx="minor">
-            <a:schemeClr val="tx1"/>
-          </a:fontRef>
-        </p:style>
-      </p:cxnSp>
-      <p:cxnSp>
-        <p:nvCxnSpPr>
-          <p:cNvPr id="38" name="Straight Connector 37">
-            <a:extLst>
-              <a:ext uri="{FF2B5EF4-FFF2-40B4-BE49-F238E27FC236}">
-                <a16:creationId xmlns:a16="http://schemas.microsoft.com/office/drawing/2014/main" id="{37976B8C-B2C0-D0EB-FCD6-9DE7BA03424F}"/>
-              </a:ext>
-            </a:extLst>
-          </p:cNvPr>
-          <p:cNvCxnSpPr>
-            <a:stCxn id="22" idx="5"/>
-            <a:endCxn id="23" idx="1"/>
-          </p:cNvCxnSpPr>
-          <p:nvPr/>
-        </p:nvCxnSpPr>
-        <p:spPr>
-          <a:xfrm>
-            <a:off x="8288487" y="2387735"/>
-            <a:ext cx="202266" cy="138978"/>
-          </a:xfrm>
-          <a:prstGeom prst="line">
-            <a:avLst/>
-          </a:prstGeom>
-        </p:spPr>
-        <p:style>
-          <a:lnRef idx="1">
-            <a:schemeClr val="accent1"/>
-          </a:lnRef>
-          <a:fillRef idx="0">
-            <a:schemeClr val="accent1"/>
-          </a:fillRef>
-          <a:effectRef idx="0">
-            <a:schemeClr val="accent1"/>
-          </a:effectRef>
-          <a:fontRef idx="minor">
-            <a:schemeClr val="tx1"/>
-          </a:fontRef>
-        </p:style>
-      </p:cxnSp>
-      <p:cxnSp>
-        <p:nvCxnSpPr>
-          <p:cNvPr id="40" name="Straight Connector 39">
-            <a:extLst>
-              <a:ext uri="{FF2B5EF4-FFF2-40B4-BE49-F238E27FC236}">
-                <a16:creationId xmlns:a16="http://schemas.microsoft.com/office/drawing/2014/main" id="{06760B4A-8D08-56FD-A6AA-45C23781A043}"/>
-              </a:ext>
-            </a:extLst>
-          </p:cNvPr>
-          <p:cNvCxnSpPr>
-            <a:cxnSpLocks/>
-            <a:endCxn id="26" idx="0"/>
-          </p:cNvCxnSpPr>
-          <p:nvPr/>
-        </p:nvCxnSpPr>
-        <p:spPr>
-          <a:xfrm flipH="1">
-            <a:off x="7824249" y="2600978"/>
-            <a:ext cx="154393" cy="248163"/>
-          </a:xfrm>
-          <a:prstGeom prst="line">
-            <a:avLst/>
-          </a:prstGeom>
-        </p:spPr>
-        <p:style>
-          <a:lnRef idx="1">
-            <a:schemeClr val="accent1"/>
-          </a:lnRef>
-          <a:fillRef idx="0">
-            <a:schemeClr val="accent1"/>
-          </a:fillRef>
-          <a:effectRef idx="0">
-            <a:schemeClr val="accent1"/>
-          </a:effectRef>
-          <a:fontRef idx="minor">
-            <a:schemeClr val="tx1"/>
-          </a:fontRef>
-        </p:style>
-      </p:cxnSp>
-      <p:cxnSp>
-        <p:nvCxnSpPr>
-          <p:cNvPr id="42" name="Straight Connector 41">
-            <a:extLst>
-              <a:ext uri="{FF2B5EF4-FFF2-40B4-BE49-F238E27FC236}">
-                <a16:creationId xmlns:a16="http://schemas.microsoft.com/office/drawing/2014/main" id="{475D1E72-279F-6E59-0395-13A853F9E368}"/>
-              </a:ext>
-            </a:extLst>
-          </p:cNvPr>
-          <p:cNvCxnSpPr>
-            <a:cxnSpLocks/>
-            <a:stCxn id="26" idx="4"/>
-          </p:cNvCxnSpPr>
-          <p:nvPr/>
-        </p:nvCxnSpPr>
-        <p:spPr>
-          <a:xfrm flipH="1">
-            <a:off x="7681278" y="2943288"/>
-            <a:ext cx="142971" cy="151055"/>
-          </a:xfrm>
-          <a:prstGeom prst="line">
-            <a:avLst/>
-          </a:prstGeom>
-        </p:spPr>
-        <p:style>
-          <a:lnRef idx="1">
-            <a:schemeClr val="accent1"/>
-          </a:lnRef>
-          <a:fillRef idx="0">
-            <a:schemeClr val="accent1"/>
-          </a:fillRef>
-          <a:effectRef idx="0">
-            <a:schemeClr val="accent1"/>
-          </a:effectRef>
-          <a:fontRef idx="minor">
-            <a:schemeClr val="tx1"/>
-          </a:fontRef>
-        </p:style>
-      </p:cxnSp>
-      <p:cxnSp>
-        <p:nvCxnSpPr>
-          <p:cNvPr id="47" name="Straight Connector 46">
-            <a:extLst>
-              <a:ext uri="{FF2B5EF4-FFF2-40B4-BE49-F238E27FC236}">
-                <a16:creationId xmlns:a16="http://schemas.microsoft.com/office/drawing/2014/main" id="{AD8E4430-1B2B-136D-EBC0-E46E741E4569}"/>
-              </a:ext>
-            </a:extLst>
-          </p:cNvPr>
-          <p:cNvCxnSpPr>
-            <a:stCxn id="26" idx="4"/>
-            <a:endCxn id="28" idx="0"/>
-          </p:cNvCxnSpPr>
-          <p:nvPr/>
-        </p:nvCxnSpPr>
-        <p:spPr>
-          <a:xfrm>
-            <a:off x="7824249" y="2943288"/>
-            <a:ext cx="126349" cy="161506"/>
-          </a:xfrm>
-          <a:prstGeom prst="line">
-            <a:avLst/>
-          </a:prstGeom>
-        </p:spPr>
-        <p:style>
-          <a:lnRef idx="1">
-            <a:schemeClr val="accent1"/>
-          </a:lnRef>
-          <a:fillRef idx="0">
-            <a:schemeClr val="accent1"/>
-          </a:fillRef>
-          <a:effectRef idx="0">
-            <a:schemeClr val="accent1"/>
-          </a:effectRef>
-          <a:fontRef idx="minor">
-            <a:schemeClr val="tx1"/>
-          </a:fontRef>
-        </p:style>
-      </p:cxnSp>
-      <p:cxnSp>
-        <p:nvCxnSpPr>
-          <p:cNvPr id="54" name="Straight Connector 53">
-            <a:extLst>
-              <a:ext uri="{FF2B5EF4-FFF2-40B4-BE49-F238E27FC236}">
-                <a16:creationId xmlns:a16="http://schemas.microsoft.com/office/drawing/2014/main" id="{A5DAB607-3B11-1206-D340-472032B6269C}"/>
-              </a:ext>
-            </a:extLst>
-          </p:cNvPr>
-          <p:cNvCxnSpPr>
-            <a:cxnSpLocks/>
-          </p:cNvCxnSpPr>
-          <p:nvPr/>
-        </p:nvCxnSpPr>
-        <p:spPr>
-          <a:xfrm>
-            <a:off x="8529320" y="2591219"/>
-            <a:ext cx="0" cy="320149"/>
-          </a:xfrm>
-          <a:prstGeom prst="line">
-            <a:avLst/>
-          </a:prstGeom>
-        </p:spPr>
-        <p:style>
-          <a:lnRef idx="1">
-            <a:schemeClr val="accent1"/>
-          </a:lnRef>
-          <a:fillRef idx="0">
-            <a:schemeClr val="accent1"/>
-          </a:fillRef>
-          <a:effectRef idx="0">
-            <a:schemeClr val="accent1"/>
-          </a:effectRef>
-          <a:fontRef idx="minor">
-            <a:schemeClr val="tx1"/>
-          </a:fontRef>
-        </p:style>
-      </p:cxnSp>
-      <p:cxnSp>
-        <p:nvCxnSpPr>
-          <p:cNvPr id="55" name="Straight Connector 54">
-            <a:extLst>
-              <a:ext uri="{FF2B5EF4-FFF2-40B4-BE49-F238E27FC236}">
-                <a16:creationId xmlns:a16="http://schemas.microsoft.com/office/drawing/2014/main" id="{768CB1FD-3B3A-854F-512D-6B23EE5F3F93}"/>
-              </a:ext>
-            </a:extLst>
-          </p:cNvPr>
-          <p:cNvCxnSpPr>
-            <a:cxnSpLocks/>
-          </p:cNvCxnSpPr>
-          <p:nvPr/>
-        </p:nvCxnSpPr>
-        <p:spPr>
-          <a:xfrm flipH="1">
-            <a:off x="8378772" y="3006693"/>
-            <a:ext cx="142971" cy="151055"/>
-          </a:xfrm>
-          <a:prstGeom prst="line">
-            <a:avLst/>
-          </a:prstGeom>
-        </p:spPr>
-        <p:style>
-          <a:lnRef idx="1">
-            <a:schemeClr val="accent1"/>
-          </a:lnRef>
-          <a:fillRef idx="0">
-            <a:schemeClr val="accent1"/>
-          </a:fillRef>
-          <a:effectRef idx="0">
-            <a:schemeClr val="accent1"/>
-          </a:effectRef>
-          <a:fontRef idx="minor">
-            <a:schemeClr val="tx1"/>
-          </a:fontRef>
-        </p:style>
-      </p:cxnSp>
-      <p:cxnSp>
-        <p:nvCxnSpPr>
-          <p:cNvPr id="56" name="Straight Connector 55">
-            <a:extLst>
-              <a:ext uri="{FF2B5EF4-FFF2-40B4-BE49-F238E27FC236}">
-                <a16:creationId xmlns:a16="http://schemas.microsoft.com/office/drawing/2014/main" id="{A6E95B61-00D3-7DC1-1C4B-7E33E8AD66B5}"/>
-              </a:ext>
-            </a:extLst>
-          </p:cNvPr>
-          <p:cNvCxnSpPr/>
-          <p:nvPr/>
-        </p:nvCxnSpPr>
-        <p:spPr>
-          <a:xfrm>
-            <a:off x="8521743" y="3006693"/>
-            <a:ext cx="126349" cy="161506"/>
-          </a:xfrm>
-          <a:prstGeom prst="line">
-            <a:avLst/>
-          </a:prstGeom>
-        </p:spPr>
-        <p:style>
-          <a:lnRef idx="1">
-            <a:schemeClr val="accent1"/>
-          </a:lnRef>
-          <a:fillRef idx="0">
-            <a:schemeClr val="accent1"/>
-          </a:fillRef>
-          <a:effectRef idx="0">
-            <a:schemeClr val="accent1"/>
-          </a:effectRef>
-          <a:fontRef idx="minor">
-            <a:schemeClr val="tx1"/>
-          </a:fontRef>
-        </p:style>
-      </p:cxnSp>
-      <p:pic>
-        <p:nvPicPr>
-          <p:cNvPr id="1026" name="Picture 2">
-            <a:extLst>
-              <a:ext uri="{FF2B5EF4-FFF2-40B4-BE49-F238E27FC236}">
-                <a16:creationId xmlns:a16="http://schemas.microsoft.com/office/drawing/2014/main" id="{84C832F3-2EEF-EE38-7F93-CC21F84F4144}"/>
-              </a:ext>
-            </a:extLst>
-          </p:cNvPr>
-          <p:cNvPicPr>
-            <a:picLocks noChangeAspect="1" noChangeArrowheads="1"/>
-          </p:cNvPicPr>
-          <p:nvPr/>
-        </p:nvPicPr>
-        <p:blipFill>
-          <a:blip r:embed="rId4">
-            <a:extLst>
-              <a:ext uri="{28A0092B-C50C-407E-A947-70E740481C1C}">
-                <a14:useLocalDpi xmlns:a14="http://schemas.microsoft.com/office/drawing/2010/main" val="0"/>
-              </a:ext>
-            </a:extLst>
-          </a:blip>
-          <a:srcRect/>
-          <a:stretch>
-            <a:fillRect/>
-          </a:stretch>
-        </p:blipFill>
-        <p:spPr bwMode="auto">
-          <a:xfrm>
-            <a:off x="8918927" y="2323085"/>
-            <a:ext cx="1441450" cy="781709"/>
-          </a:xfrm>
-          <a:prstGeom prst="rect">
-            <a:avLst/>
-          </a:prstGeom>
-          <a:noFill/>
-          <a:extLst>
-            <a:ext uri="{909E8E84-426E-40DD-AFC4-6F175D3DCCD1}">
-              <a14:hiddenFill xmlns:a14="http://schemas.microsoft.com/office/drawing/2010/main">
-                <a:solidFill>
-                  <a:srgbClr val="FFFFFF"/>
-                </a:solidFill>
-              </a14:hiddenFill>
-            </a:ext>
-          </a:extLst>
-        </p:spPr>
-      </p:pic>
     </p:spTree>
     <p:extLst>
       <p:ext uri="{BB962C8B-B14F-4D97-AF65-F5344CB8AC3E}">
-        <p14:creationId xmlns:p14="http://schemas.microsoft.com/office/powerpoint/2010/main" val="3323987772"/>
+        <p14:creationId xmlns:p14="http://schemas.microsoft.com/office/powerpoint/2010/main" val="2496691747"/>
       </p:ext>
     </p:extLst>
   </p:cSld>

</xml_diff>